<commit_message>
Update ShowTopologicalOrder sequence diagram
</commit_message>
<xml_diff>
--- a/docs/diagrams/ShowTopologicalOrderCommandSequenceDiagram.pptx
+++ b/docs/diagrams/ShowTopologicalOrderCommandSequenceDiagram.pptx
@@ -3534,8 +3534,8 @@
         </p:nvSpPr>
         <p:spPr>
           <a:xfrm>
-            <a:off x="6431567" y="198977"/>
-            <a:ext cx="3423723" cy="5895763"/>
+            <a:off x="6431568" y="152400"/>
+            <a:ext cx="5640680" cy="5895763"/>
           </a:xfrm>
           <a:prstGeom prst="roundRect">
             <a:avLst>
@@ -4933,6 +4933,14 @@
           <a:lstStyle/>
           <a:p>
             <a:pPr algn="ctr"/>
+            <a:r>
+              <a:rPr lang="en-US" sz="1600" dirty="0">
+                <a:solidFill>
+                  <a:schemeClr val="bg1"/>
+                </a:solidFill>
+              </a:rPr>
+              <a:t>:</a:t>
+            </a:r>
             <a:r>
               <a:rPr lang="en-US" sz="1600" dirty="0" err="1">
                 <a:solidFill>
@@ -5483,10 +5491,94 @@
       </p:sp>
       <p:sp>
         <p:nvSpPr>
-          <p:cNvPr id="70" name="Rectangle 65">
+          <p:cNvPr id="72" name="TextBox 71">
             <a:extLst>
               <a:ext uri="{FF2B5EF4-FFF2-40B4-BE49-F238E27FC236}">
-                <a16:creationId xmlns:a16="http://schemas.microsoft.com/office/drawing/2014/main" id="{3D1D7B04-519F-BC40-B4A3-3F034036E39B}"/>
+                <a16:creationId xmlns:a16="http://schemas.microsoft.com/office/drawing/2014/main" id="{F58C812B-0B64-9C4B-990B-4AD0F21C1937}"/>
+              </a:ext>
+            </a:extLst>
+          </p:cNvPr>
+          <p:cNvSpPr txBox="1"/>
+          <p:nvPr/>
+        </p:nvSpPr>
+        <p:spPr>
+          <a:xfrm>
+            <a:off x="7776240" y="3270883"/>
+            <a:ext cx="2131614" cy="138499"/>
+          </a:xfrm>
+          <a:prstGeom prst="rect">
+            <a:avLst/>
+          </a:prstGeom>
+          <a:noFill/>
+          <a:ln>
+            <a:noFill/>
+          </a:ln>
+        </p:spPr>
+        <p:txBody>
+          <a:bodyPr wrap="square" lIns="0" tIns="0" rIns="0" bIns="0" rtlCol="0">
+            <a:spAutoFit/>
+          </a:bodyPr>
+          <a:lstStyle>
+            <a:defPPr>
+              <a:defRPr lang="en-US"/>
+            </a:defPPr>
+            <a:lvl1pPr algn="r">
+              <a:defRPr sz="1400">
+                <a:solidFill>
+                  <a:srgbClr val="0070C0"/>
+                </a:solidFill>
+              </a:defRPr>
+            </a:lvl1pPr>
+          </a:lstStyle>
+          <a:p>
+            <a:r>
+              <a:rPr lang="en-US" sz="900" dirty="0" err="1">
+                <a:solidFill>
+                  <a:srgbClr val="7030A0"/>
+                </a:solidFill>
+              </a:rPr>
+              <a:t>DependencyGraph</a:t>
+            </a:r>
+            <a:r>
+              <a:rPr lang="en-US" sz="900" dirty="0">
+                <a:solidFill>
+                  <a:srgbClr val="7030A0"/>
+                </a:solidFill>
+              </a:rPr>
+              <a:t>(</a:t>
+            </a:r>
+            <a:r>
+              <a:rPr lang="en-US" sz="900" dirty="0" err="1">
+                <a:solidFill>
+                  <a:srgbClr val="7030A0"/>
+                </a:solidFill>
+              </a:rPr>
+              <a:t>taskList</a:t>
+            </a:r>
+            <a:r>
+              <a:rPr lang="en-US" sz="900" dirty="0">
+                <a:solidFill>
+                  <a:srgbClr val="7030A0"/>
+                </a:solidFill>
+              </a:rPr>
+              <a:t>)</a:t>
+            </a:r>
+            <a:endParaRPr lang="en-US" sz="900" dirty="0">
+              <a:solidFill>
+                <a:schemeClr val="accent4">
+                  <a:lumMod val="75000"/>
+                </a:schemeClr>
+              </a:solidFill>
+            </a:endParaRPr>
+          </a:p>
+        </p:txBody>
+      </p:sp>
+      <p:sp>
+        <p:nvSpPr>
+          <p:cNvPr id="73" name="Rectangle 72">
+            <a:extLst>
+              <a:ext uri="{FF2B5EF4-FFF2-40B4-BE49-F238E27FC236}">
+                <a16:creationId xmlns:a16="http://schemas.microsoft.com/office/drawing/2014/main" id="{EED57EE4-32FB-CD49-B907-F95335545DC7}"/>
               </a:ext>
             </a:extLst>
           </p:cNvPr>
@@ -5495,19 +5587,67 @@
         </p:nvSpPr>
         <p:spPr>
           <a:xfrm>
-            <a:off x="9896172" y="195875"/>
-            <a:ext cx="2336741" cy="5895763"/>
-          </a:xfrm>
-          <a:prstGeom prst="roundRect">
-            <a:avLst>
-              <a:gd name="adj" fmla="val 3484"/>
-            </a:avLst>
+            <a:off x="10820400" y="3429000"/>
+            <a:ext cx="129933" cy="235314"/>
+          </a:xfrm>
+          <a:prstGeom prst="rect">
+            <a:avLst/>
           </a:prstGeom>
           <a:solidFill>
-            <a:schemeClr val="accent6">
-              <a:lumMod val="20000"/>
-              <a:lumOff val="80000"/>
-            </a:schemeClr>
+            <a:srgbClr val="7030A0"/>
+          </a:solidFill>
+          <a:ln>
+            <a:solidFill>
+              <a:srgbClr val="7030A0"/>
+            </a:solidFill>
+          </a:ln>
+          <a:effectLst/>
+        </p:spPr>
+        <p:style>
+          <a:lnRef idx="1">
+            <a:schemeClr val="accent3"/>
+          </a:lnRef>
+          <a:fillRef idx="2">
+            <a:schemeClr val="accent3"/>
+          </a:fillRef>
+          <a:effectRef idx="1">
+            <a:schemeClr val="accent3"/>
+          </a:effectRef>
+          <a:fontRef idx="minor">
+            <a:schemeClr val="dk1"/>
+          </a:fontRef>
+        </p:style>
+        <p:txBody>
+          <a:bodyPr rtlCol="0" anchor="ctr"/>
+          <a:lstStyle/>
+          <a:p>
+            <a:pPr algn="ctr"/>
+            <a:endParaRPr lang="en-SG" sz="1400" dirty="0"/>
+          </a:p>
+        </p:txBody>
+      </p:sp>
+      <p:sp>
+        <p:nvSpPr>
+          <p:cNvPr id="71" name="Rectangle 62">
+            <a:extLst>
+              <a:ext uri="{FF2B5EF4-FFF2-40B4-BE49-F238E27FC236}">
+                <a16:creationId xmlns:a16="http://schemas.microsoft.com/office/drawing/2014/main" id="{0CB19D04-7540-C94A-AED5-B714967C6FB8}"/>
+              </a:ext>
+            </a:extLst>
+          </p:cNvPr>
+          <p:cNvSpPr/>
+          <p:nvPr/>
+        </p:nvSpPr>
+        <p:spPr>
+          <a:xfrm>
+            <a:off x="10042663" y="3233051"/>
+            <a:ext cx="1937091" cy="312522"/>
+          </a:xfrm>
+          <a:prstGeom prst="rect">
+            <a:avLst/>
+          </a:prstGeom>
+          <a:solidFill>
+            <a:srgbClr val="7030A0"/>
           </a:solidFill>
           <a:ln w="19050">
             <a:noFill/>
@@ -5529,205 +5669,6 @@
           </a:fontRef>
         </p:style>
         <p:txBody>
-          <a:bodyPr rtlCol="0" anchor="t"/>
-          <a:lstStyle/>
-          <a:p>
-            <a:r>
-              <a:rPr lang="en-US" sz="1200" b="1">
-                <a:solidFill>
-                  <a:schemeClr val="accent6"/>
-                </a:solidFill>
-              </a:rPr>
-              <a:t>DependencyGraph</a:t>
-            </a:r>
-            <a:endParaRPr lang="en-SG" sz="1200" b="1" dirty="0">
-              <a:solidFill>
-                <a:schemeClr val="accent6"/>
-              </a:solidFill>
-            </a:endParaRPr>
-          </a:p>
-        </p:txBody>
-      </p:sp>
-      <p:sp>
-        <p:nvSpPr>
-          <p:cNvPr id="72" name="TextBox 71">
-            <a:extLst>
-              <a:ext uri="{FF2B5EF4-FFF2-40B4-BE49-F238E27FC236}">
-                <a16:creationId xmlns:a16="http://schemas.microsoft.com/office/drawing/2014/main" id="{F58C812B-0B64-9C4B-990B-4AD0F21C1937}"/>
-              </a:ext>
-            </a:extLst>
-          </p:cNvPr>
-          <p:cNvSpPr txBox="1"/>
-          <p:nvPr/>
-        </p:nvSpPr>
-        <p:spPr>
-          <a:xfrm>
-            <a:off x="7776240" y="3270883"/>
-            <a:ext cx="2131614" cy="138499"/>
-          </a:xfrm>
-          <a:prstGeom prst="rect">
-            <a:avLst/>
-          </a:prstGeom>
-          <a:noFill/>
-          <a:ln>
-            <a:noFill/>
-          </a:ln>
-        </p:spPr>
-        <p:txBody>
-          <a:bodyPr wrap="square" lIns="0" tIns="0" rIns="0" bIns="0" rtlCol="0">
-            <a:spAutoFit/>
-          </a:bodyPr>
-          <a:lstStyle>
-            <a:defPPr>
-              <a:defRPr lang="en-US"/>
-            </a:defPPr>
-            <a:lvl1pPr algn="r">
-              <a:defRPr sz="1400">
-                <a:solidFill>
-                  <a:srgbClr val="0070C0"/>
-                </a:solidFill>
-              </a:defRPr>
-            </a:lvl1pPr>
-          </a:lstStyle>
-          <a:p>
-            <a:r>
-              <a:rPr lang="en-US" sz="900" dirty="0" err="1">
-                <a:solidFill>
-                  <a:srgbClr val="7030A0"/>
-                </a:solidFill>
-              </a:rPr>
-              <a:t>DependencyGraph</a:t>
-            </a:r>
-            <a:r>
-              <a:rPr lang="en-US" sz="900" dirty="0">
-                <a:solidFill>
-                  <a:srgbClr val="7030A0"/>
-                </a:solidFill>
-              </a:rPr>
-              <a:t>(</a:t>
-            </a:r>
-            <a:r>
-              <a:rPr lang="en-US" sz="900" dirty="0" err="1">
-                <a:solidFill>
-                  <a:srgbClr val="7030A0"/>
-                </a:solidFill>
-              </a:rPr>
-              <a:t>taskList</a:t>
-            </a:r>
-            <a:r>
-              <a:rPr lang="en-US" sz="900" dirty="0">
-                <a:solidFill>
-                  <a:srgbClr val="7030A0"/>
-                </a:solidFill>
-              </a:rPr>
-              <a:t>)</a:t>
-            </a:r>
-            <a:endParaRPr lang="en-US" sz="900" dirty="0">
-              <a:solidFill>
-                <a:schemeClr val="accent4">
-                  <a:lumMod val="75000"/>
-                </a:schemeClr>
-              </a:solidFill>
-            </a:endParaRPr>
-          </a:p>
-        </p:txBody>
-      </p:sp>
-      <p:sp>
-        <p:nvSpPr>
-          <p:cNvPr id="73" name="Rectangle 72">
-            <a:extLst>
-              <a:ext uri="{FF2B5EF4-FFF2-40B4-BE49-F238E27FC236}">
-                <a16:creationId xmlns:a16="http://schemas.microsoft.com/office/drawing/2014/main" id="{EED57EE4-32FB-CD49-B907-F95335545DC7}"/>
-              </a:ext>
-            </a:extLst>
-          </p:cNvPr>
-          <p:cNvSpPr/>
-          <p:nvPr/>
-        </p:nvSpPr>
-        <p:spPr>
-          <a:xfrm>
-            <a:off x="10820400" y="3429000"/>
-            <a:ext cx="129933" cy="235314"/>
-          </a:xfrm>
-          <a:prstGeom prst="rect">
-            <a:avLst/>
-          </a:prstGeom>
-          <a:solidFill>
-            <a:schemeClr val="accent6"/>
-          </a:solidFill>
-          <a:ln>
-            <a:solidFill>
-              <a:srgbClr val="0070C0"/>
-            </a:solidFill>
-          </a:ln>
-          <a:effectLst/>
-        </p:spPr>
-        <p:style>
-          <a:lnRef idx="1">
-            <a:schemeClr val="accent3"/>
-          </a:lnRef>
-          <a:fillRef idx="2">
-            <a:schemeClr val="accent3"/>
-          </a:fillRef>
-          <a:effectRef idx="1">
-            <a:schemeClr val="accent3"/>
-          </a:effectRef>
-          <a:fontRef idx="minor">
-            <a:schemeClr val="dk1"/>
-          </a:fontRef>
-        </p:style>
-        <p:txBody>
-          <a:bodyPr rtlCol="0" anchor="ctr"/>
-          <a:lstStyle/>
-          <a:p>
-            <a:pPr algn="ctr"/>
-            <a:endParaRPr lang="en-SG" sz="1400" dirty="0"/>
-          </a:p>
-        </p:txBody>
-      </p:sp>
-      <p:sp>
-        <p:nvSpPr>
-          <p:cNvPr id="71" name="Rectangle 62">
-            <a:extLst>
-              <a:ext uri="{FF2B5EF4-FFF2-40B4-BE49-F238E27FC236}">
-                <a16:creationId xmlns:a16="http://schemas.microsoft.com/office/drawing/2014/main" id="{0CB19D04-7540-C94A-AED5-B714967C6FB8}"/>
-              </a:ext>
-            </a:extLst>
-          </p:cNvPr>
-          <p:cNvSpPr/>
-          <p:nvPr/>
-        </p:nvSpPr>
-        <p:spPr>
-          <a:xfrm>
-            <a:off x="10042663" y="3233051"/>
-            <a:ext cx="1937091" cy="312522"/>
-          </a:xfrm>
-          <a:prstGeom prst="rect">
-            <a:avLst/>
-          </a:prstGeom>
-          <a:solidFill>
-            <a:schemeClr val="accent6"/>
-          </a:solidFill>
-          <a:ln w="19050">
-            <a:noFill/>
-          </a:ln>
-          <a:effectLst/>
-        </p:spPr>
-        <p:style>
-          <a:lnRef idx="1">
-            <a:schemeClr val="accent2"/>
-          </a:lnRef>
-          <a:fillRef idx="2">
-            <a:schemeClr val="accent2"/>
-          </a:fillRef>
-          <a:effectRef idx="1">
-            <a:schemeClr val="accent2"/>
-          </a:effectRef>
-          <a:fontRef idx="minor">
-            <a:schemeClr val="dk1"/>
-          </a:fontRef>
-        </p:style>
-        <p:txBody>
           <a:bodyPr rtlCol="0" anchor="ctr"/>
           <a:lstStyle/>
           <a:p>
@@ -5780,7 +5721,7 @@
           </a:prstGeom>
           <a:ln w="19050">
             <a:solidFill>
-              <a:schemeClr val="accent6"/>
+              <a:srgbClr val="7030A0"/>
             </a:solidFill>
             <a:prstDash val="sysDash"/>
           </a:ln>
@@ -5798,52 +5739,6 @@
           </a:effectRef>
           <a:fontRef idx="minor">
             <a:schemeClr val="dk1"/>
-          </a:fontRef>
-        </p:style>
-      </p:cxnSp>
-      <p:cxnSp>
-        <p:nvCxnSpPr>
-          <p:cNvPr id="77" name="Straight Arrow Connector 76">
-            <a:extLst>
-              <a:ext uri="{FF2B5EF4-FFF2-40B4-BE49-F238E27FC236}">
-                <a16:creationId xmlns:a16="http://schemas.microsoft.com/office/drawing/2014/main" id="{5D824804-C598-B241-AB22-4BDEDB61EA0A}"/>
-              </a:ext>
-            </a:extLst>
-          </p:cNvPr>
-          <p:cNvCxnSpPr>
-            <a:cxnSpLocks/>
-          </p:cNvCxnSpPr>
-          <p:nvPr/>
-        </p:nvCxnSpPr>
-        <p:spPr>
-          <a:xfrm>
-            <a:off x="8528428" y="3657600"/>
-            <a:ext cx="2292279" cy="0"/>
-          </a:xfrm>
-          <a:prstGeom prst="straightConnector1">
-            <a:avLst/>
-          </a:prstGeom>
-          <a:ln w="19050">
-            <a:solidFill>
-              <a:schemeClr val="accent6"/>
-            </a:solidFill>
-            <a:prstDash val="sysDash"/>
-            <a:headEnd type="arrow" w="med" len="med"/>
-            <a:tailEnd type="none" w="med" len="med"/>
-          </a:ln>
-        </p:spPr>
-        <p:style>
-          <a:lnRef idx="1">
-            <a:schemeClr val="accent1"/>
-          </a:lnRef>
-          <a:fillRef idx="0">
-            <a:schemeClr val="accent1"/>
-          </a:fillRef>
-          <a:effectRef idx="0">
-            <a:schemeClr val="accent1"/>
-          </a:effectRef>
-          <a:fontRef idx="minor">
-            <a:schemeClr val="tx1"/>
           </a:fontRef>
         </p:style>
       </p:cxnSp>
@@ -5868,11 +5763,11 @@
             <a:avLst/>
           </a:prstGeom>
           <a:solidFill>
-            <a:schemeClr val="accent6"/>
+            <a:srgbClr val="7030A0"/>
           </a:solidFill>
           <a:ln>
             <a:solidFill>
-              <a:srgbClr val="0070C0"/>
+              <a:srgbClr val="7030A0"/>
             </a:solidFill>
           </a:ln>
           <a:effectLst/>
@@ -5988,52 +5883,6 @@
           </a:fontRef>
         </p:style>
       </p:cxnSp>
-      <p:cxnSp>
-        <p:nvCxnSpPr>
-          <p:cNvPr id="88" name="Straight Arrow Connector 87">
-            <a:extLst>
-              <a:ext uri="{FF2B5EF4-FFF2-40B4-BE49-F238E27FC236}">
-                <a16:creationId xmlns:a16="http://schemas.microsoft.com/office/drawing/2014/main" id="{9F824A57-FCD6-C349-9992-7BBFAC255222}"/>
-              </a:ext>
-            </a:extLst>
-          </p:cNvPr>
-          <p:cNvCxnSpPr>
-            <a:cxnSpLocks/>
-          </p:cNvCxnSpPr>
-          <p:nvPr/>
-        </p:nvCxnSpPr>
-        <p:spPr>
-          <a:xfrm>
-            <a:off x="8540935" y="3964407"/>
-            <a:ext cx="2292279" cy="0"/>
-          </a:xfrm>
-          <a:prstGeom prst="straightConnector1">
-            <a:avLst/>
-          </a:prstGeom>
-          <a:ln w="19050">
-            <a:solidFill>
-              <a:schemeClr val="accent6"/>
-            </a:solidFill>
-            <a:prstDash val="sysDash"/>
-            <a:headEnd type="arrow" w="med" len="med"/>
-            <a:tailEnd type="none" w="med" len="med"/>
-          </a:ln>
-        </p:spPr>
-        <p:style>
-          <a:lnRef idx="1">
-            <a:schemeClr val="accent1"/>
-          </a:lnRef>
-          <a:fillRef idx="0">
-            <a:schemeClr val="accent1"/>
-          </a:fillRef>
-          <a:effectRef idx="0">
-            <a:schemeClr val="accent1"/>
-          </a:effectRef>
-          <a:fontRef idx="minor">
-            <a:schemeClr val="tx1"/>
-          </a:fontRef>
-        </p:style>
-      </p:cxnSp>
       <p:sp>
         <p:nvSpPr>
           <p:cNvPr id="90" name="TextBox 89">
@@ -6147,7 +5996,7 @@
             <a:r>
               <a:rPr lang="en-US" sz="900" dirty="0">
                 <a:solidFill>
-                  <a:schemeClr val="accent6"/>
+                  <a:srgbClr val="7030A0"/>
                 </a:solidFill>
               </a:rPr>
               <a:t>list</a:t>
@@ -6169,7 +6018,7 @@
         </p:nvSpPr>
         <p:spPr>
           <a:xfrm>
-            <a:off x="10778938" y="5263225"/>
+            <a:off x="10820400" y="5181600"/>
             <a:ext cx="258404" cy="261610"/>
           </a:xfrm>
           <a:prstGeom prst="rect">
@@ -6653,6 +6502,98 @@
             </a:solidFill>
             <a:prstDash val="dash"/>
             <a:tailEnd type="triangle"/>
+          </a:ln>
+        </p:spPr>
+        <p:style>
+          <a:lnRef idx="1">
+            <a:schemeClr val="accent1"/>
+          </a:lnRef>
+          <a:fillRef idx="0">
+            <a:schemeClr val="accent1"/>
+          </a:fillRef>
+          <a:effectRef idx="0">
+            <a:schemeClr val="accent1"/>
+          </a:effectRef>
+          <a:fontRef idx="minor">
+            <a:schemeClr val="tx1"/>
+          </a:fontRef>
+        </p:style>
+      </p:cxnSp>
+      <p:cxnSp>
+        <p:nvCxnSpPr>
+          <p:cNvPr id="74" name="Straight Arrow Connector 73">
+            <a:extLst>
+              <a:ext uri="{FF2B5EF4-FFF2-40B4-BE49-F238E27FC236}">
+                <a16:creationId xmlns:a16="http://schemas.microsoft.com/office/drawing/2014/main" id="{655C7959-65EF-C943-886A-D49A464377CA}"/>
+              </a:ext>
+            </a:extLst>
+          </p:cNvPr>
+          <p:cNvCxnSpPr>
+            <a:cxnSpLocks/>
+          </p:cNvCxnSpPr>
+          <p:nvPr/>
+        </p:nvCxnSpPr>
+        <p:spPr>
+          <a:xfrm>
+            <a:off x="8538750" y="3962400"/>
+            <a:ext cx="2281650" cy="0"/>
+          </a:xfrm>
+          <a:prstGeom prst="straightConnector1">
+            <a:avLst/>
+          </a:prstGeom>
+          <a:ln w="19050">
+            <a:solidFill>
+              <a:srgbClr val="7030A0"/>
+            </a:solidFill>
+            <a:prstDash val="sysDash"/>
+            <a:headEnd type="arrow" w="med" len="med"/>
+            <a:tailEnd type="none" w="med" len="med"/>
+          </a:ln>
+        </p:spPr>
+        <p:style>
+          <a:lnRef idx="1">
+            <a:schemeClr val="accent1"/>
+          </a:lnRef>
+          <a:fillRef idx="0">
+            <a:schemeClr val="accent1"/>
+          </a:fillRef>
+          <a:effectRef idx="0">
+            <a:schemeClr val="accent1"/>
+          </a:effectRef>
+          <a:fontRef idx="minor">
+            <a:schemeClr val="tx1"/>
+          </a:fontRef>
+        </p:style>
+      </p:cxnSp>
+      <p:cxnSp>
+        <p:nvCxnSpPr>
+          <p:cNvPr id="75" name="Straight Arrow Connector 74">
+            <a:extLst>
+              <a:ext uri="{FF2B5EF4-FFF2-40B4-BE49-F238E27FC236}">
+                <a16:creationId xmlns:a16="http://schemas.microsoft.com/office/drawing/2014/main" id="{94772B10-B3DB-D941-91F2-C56D7489294A}"/>
+              </a:ext>
+            </a:extLst>
+          </p:cNvPr>
+          <p:cNvCxnSpPr>
+            <a:cxnSpLocks/>
+          </p:cNvCxnSpPr>
+          <p:nvPr/>
+        </p:nvCxnSpPr>
+        <p:spPr>
+          <a:xfrm>
+            <a:off x="8517765" y="3657600"/>
+            <a:ext cx="2281650" cy="0"/>
+          </a:xfrm>
+          <a:prstGeom prst="straightConnector1">
+            <a:avLst/>
+          </a:prstGeom>
+          <a:ln w="19050">
+            <a:solidFill>
+              <a:srgbClr val="7030A0"/>
+            </a:solidFill>
+            <a:prstDash val="sysDash"/>
+            <a:headEnd type="arrow" w="med" len="med"/>
+            <a:tailEnd type="none" w="med" len="med"/>
           </a:ln>
         </p:spPr>
         <p:style>

</xml_diff>